<commit_message>
new files to work with google app engine
</commit_message>
<xml_diff>
--- a/mock up.pptx
+++ b/mock up.pptx
@@ -5,9 +5,17 @@
     <p:sldMasterId id="2147483648" r:id="rId1"/>
   </p:sldMasterIdLst>
   <p:sldIdLst>
-    <p:sldId id="257" r:id="rId2"/>
-    <p:sldId id="258" r:id="rId3"/>
-    <p:sldId id="256" r:id="rId4"/>
+    <p:sldId id="266" r:id="rId2"/>
+    <p:sldId id="257" r:id="rId3"/>
+    <p:sldId id="267" r:id="rId4"/>
+    <p:sldId id="258" r:id="rId5"/>
+    <p:sldId id="265" r:id="rId6"/>
+    <p:sldId id="263" r:id="rId7"/>
+    <p:sldId id="256" r:id="rId8"/>
+    <p:sldId id="259" r:id="rId9"/>
+    <p:sldId id="264" r:id="rId10"/>
+    <p:sldId id="261" r:id="rId11"/>
+    <p:sldId id="262" r:id="rId12"/>
   </p:sldIdLst>
   <p:sldSz cx="9144000" cy="6858000" type="screen4x3"/>
   <p:notesSz cx="6858000" cy="9144000"/>
@@ -3126,29 +3134,35 @@
       </p:sp>
       <p:sp>
         <p:nvSpPr>
-          <p:cNvPr id="3" name="Content Placeholder 2"/>
-          <p:cNvSpPr>
+          <p:cNvPr id="4" name="Content Placeholder 3"/>
+          <p:cNvSpPr txBox="1">
             <a:spLocks noGrp="1"/>
           </p:cNvSpPr>
           <p:nvPr>
             <p:ph idx="1"/>
           </p:nvPr>
         </p:nvSpPr>
-        <p:spPr/>
-        <p:txBody>
-          <a:bodyPr/>
+        <p:spPr>
+          <a:prstGeom prst="rect">
+            <a:avLst/>
+          </a:prstGeom>
+          <a:noFill/>
+        </p:spPr>
+        <p:txBody>
+          <a:bodyPr wrap="none" rtlCol="0">
+            <a:spAutoFit/>
+          </a:bodyPr>
           <a:lstStyle/>
           <a:p>
             <a:r>
               <a:rPr lang="en-US" dirty="0" smtClean="0"/>
-              <a:t>Dating website</a:t>
-            </a:r>
-          </a:p>
-          <a:p>
-            <a:pPr lvl="1"/>
+              <a:t>Cheryl Lee</a:t>
+            </a:r>
+          </a:p>
+          <a:p>
             <a:r>
               <a:rPr lang="en-US" dirty="0" smtClean="0"/>
-              <a:t>allows people to meet other singles online.</a:t>
+              <a:t>Nicolas Huang</a:t>
             </a:r>
             <a:endParaRPr lang="en-US" dirty="0"/>
           </a:p>
@@ -3157,13 +3171,458 @@
     </p:spTree>
     <p:extLst>
       <p:ext uri="{BB962C8B-B14F-4D97-AF65-F5344CB8AC3E}">
-        <p14:creationId xmlns:p14="http://schemas.microsoft.com/office/powerpoint/2010/main" val="133750671"/>
+        <p14:creationId xmlns:p14="http://schemas.microsoft.com/office/powerpoint/2010/main" val="2835653603"/>
       </p:ext>
     </p:extLst>
   </p:cSld>
   <p:clrMapOvr>
     <a:masterClrMapping/>
   </p:clrMapOvr>
+  <p:timing>
+    <p:tnLst>
+      <p:par>
+        <p:cTn xmlns:p14="http://schemas.microsoft.com/office/powerpoint/2010/main" id="1" dur="indefinite" restart="never" nodeType="tmRoot"/>
+      </p:par>
+    </p:tnLst>
+  </p:timing>
+</p:sld>
+</file>
+
+<file path=ppt/slides/slide10.xml><?xml version="1.0" encoding="utf-8"?>
+<p:sld xmlns:a="http://schemas.openxmlformats.org/drawingml/2006/main" xmlns:r="http://schemas.openxmlformats.org/officeDocument/2006/relationships" xmlns:p="http://schemas.openxmlformats.org/presentationml/2006/main">
+  <p:cSld>
+    <p:spTree>
+      <p:nvGrpSpPr>
+        <p:cNvPr id="1" name=""/>
+        <p:cNvGrpSpPr/>
+        <p:nvPr/>
+      </p:nvGrpSpPr>
+      <p:grpSpPr>
+        <a:xfrm>
+          <a:off x="0" y="0"/>
+          <a:ext cx="0" cy="0"/>
+          <a:chOff x="0" y="0"/>
+          <a:chExt cx="0" cy="0"/>
+        </a:xfrm>
+      </p:grpSpPr>
+      <p:pic>
+        <p:nvPicPr>
+          <p:cNvPr id="10" name="Picture 9" descr="Screen Shot 2013-05-23 at 4.57.44 PM.png"/>
+          <p:cNvPicPr>
+            <a:picLocks noChangeAspect="1"/>
+          </p:cNvPicPr>
+          <p:nvPr/>
+        </p:nvPicPr>
+        <p:blipFill>
+          <a:blip r:embed="rId2">
+            <a:extLst>
+              <a:ext uri="{28A0092B-C50C-407E-A947-70E740481C1C}">
+                <a14:useLocalDpi xmlns:a14="http://schemas.microsoft.com/office/drawing/2010/main" val="0"/>
+              </a:ext>
+            </a:extLst>
+          </a:blip>
+          <a:stretch>
+            <a:fillRect/>
+          </a:stretch>
+        </p:blipFill>
+        <p:spPr>
+          <a:xfrm>
+            <a:off x="0" y="162120"/>
+            <a:ext cx="9144000" cy="5998428"/>
+          </a:xfrm>
+          <a:prstGeom prst="rect">
+            <a:avLst/>
+          </a:prstGeom>
+        </p:spPr>
+      </p:pic>
+      <p:sp>
+        <p:nvSpPr>
+          <p:cNvPr id="6" name="TextBox 5"/>
+          <p:cNvSpPr txBox="1"/>
+          <p:nvPr/>
+        </p:nvSpPr>
+        <p:spPr>
+          <a:xfrm>
+            <a:off x="973475" y="1013248"/>
+            <a:ext cx="7052437" cy="646331"/>
+          </a:xfrm>
+          <a:prstGeom prst="rect">
+            <a:avLst/>
+          </a:prstGeom>
+          <a:noFill/>
+        </p:spPr>
+        <p:txBody>
+          <a:bodyPr wrap="square" rtlCol="0">
+            <a:spAutoFit/>
+          </a:bodyPr>
+          <a:lstStyle/>
+          <a:p>
+            <a:r>
+              <a:rPr lang="en-US" dirty="0" smtClean="0"/>
+              <a:t>You have indicated that you would like to meet </a:t>
+            </a:r>
+            <a:r>
+              <a:rPr lang="en-US" dirty="0" err="1" smtClean="0"/>
+              <a:t>Serina</a:t>
+            </a:r>
+            <a:r>
+              <a:rPr lang="en-US" dirty="0" smtClean="0"/>
+              <a:t> Wee. Guess what? She wants to meet you too! Here are her contact details:</a:t>
+            </a:r>
+          </a:p>
+        </p:txBody>
+      </p:sp>
+      <p:pic>
+        <p:nvPicPr>
+          <p:cNvPr id="11" name="Picture 10" descr="serina-wee-01.jpg"/>
+          <p:cNvPicPr>
+            <a:picLocks noChangeAspect="1"/>
+          </p:cNvPicPr>
+          <p:nvPr/>
+        </p:nvPicPr>
+        <p:blipFill>
+          <a:blip r:embed="rId3">
+            <a:extLst>
+              <a:ext uri="{28A0092B-C50C-407E-A947-70E740481C1C}">
+                <a14:useLocalDpi xmlns:a14="http://schemas.microsoft.com/office/drawing/2010/main" val="0"/>
+              </a:ext>
+            </a:extLst>
+          </a:blip>
+          <a:stretch>
+            <a:fillRect/>
+          </a:stretch>
+        </p:blipFill>
+        <p:spPr>
+          <a:xfrm>
+            <a:off x="1399890" y="2121066"/>
+            <a:ext cx="1914599" cy="2985704"/>
+          </a:xfrm>
+          <a:prstGeom prst="rect">
+            <a:avLst/>
+          </a:prstGeom>
+        </p:spPr>
+      </p:pic>
+      <p:sp>
+        <p:nvSpPr>
+          <p:cNvPr id="2" name="TextBox 1"/>
+          <p:cNvSpPr txBox="1"/>
+          <p:nvPr/>
+        </p:nvSpPr>
+        <p:spPr>
+          <a:xfrm>
+            <a:off x="3729212" y="2958684"/>
+            <a:ext cx="3070297" cy="923330"/>
+          </a:xfrm>
+          <a:prstGeom prst="rect">
+            <a:avLst/>
+          </a:prstGeom>
+          <a:noFill/>
+        </p:spPr>
+        <p:txBody>
+          <a:bodyPr wrap="none" rtlCol="0">
+            <a:spAutoFit/>
+          </a:bodyPr>
+          <a:lstStyle/>
+          <a:p>
+            <a:r>
+              <a:rPr lang="en-US" dirty="0" smtClean="0"/>
+              <a:t>HP: 90105544</a:t>
+            </a:r>
+          </a:p>
+          <a:p>
+            <a:r>
+              <a:rPr lang="en-US" dirty="0" smtClean="0"/>
+              <a:t>Email: </a:t>
+            </a:r>
+            <a:r>
+              <a:rPr lang="en-US" dirty="0" err="1" smtClean="0"/>
+              <a:t>serina_wee@gmail.com</a:t>
+            </a:r>
+            <a:endParaRPr lang="en-US" dirty="0" smtClean="0"/>
+          </a:p>
+          <a:p>
+            <a:endParaRPr lang="en-US" dirty="0"/>
+          </a:p>
+        </p:txBody>
+      </p:sp>
+      <p:sp>
+        <p:nvSpPr>
+          <p:cNvPr id="12" name="Rectangle 11"/>
+          <p:cNvSpPr/>
+          <p:nvPr/>
+        </p:nvSpPr>
+        <p:spPr>
+          <a:xfrm>
+            <a:off x="1540345" y="243179"/>
+            <a:ext cx="567472" cy="283710"/>
+          </a:xfrm>
+          <a:prstGeom prst="rect">
+            <a:avLst/>
+          </a:prstGeom>
+          <a:noFill/>
+          <a:ln w="28575" cmpd="sng">
+            <a:solidFill>
+              <a:schemeClr val="accent5">
+                <a:lumMod val="50000"/>
+              </a:schemeClr>
+            </a:solidFill>
+          </a:ln>
+        </p:spPr>
+        <p:style>
+          <a:lnRef idx="1">
+            <a:schemeClr val="accent1"/>
+          </a:lnRef>
+          <a:fillRef idx="3">
+            <a:schemeClr val="accent1"/>
+          </a:fillRef>
+          <a:effectRef idx="2">
+            <a:schemeClr val="accent1"/>
+          </a:effectRef>
+          <a:fontRef idx="minor">
+            <a:schemeClr val="lt1"/>
+          </a:fontRef>
+        </p:style>
+        <p:txBody>
+          <a:bodyPr rtlCol="0" anchor="ctr"/>
+          <a:lstStyle/>
+          <a:p>
+            <a:pPr algn="ctr"/>
+            <a:endParaRPr lang="en-US"/>
+          </a:p>
+        </p:txBody>
+      </p:sp>
+    </p:spTree>
+    <p:extLst>
+      <p:ext uri="{BB962C8B-B14F-4D97-AF65-F5344CB8AC3E}">
+        <p14:creationId xmlns:p14="http://schemas.microsoft.com/office/powerpoint/2010/main" val="3130399576"/>
+      </p:ext>
+    </p:extLst>
+  </p:cSld>
+  <p:clrMapOvr>
+    <a:masterClrMapping/>
+  </p:clrMapOvr>
+  <p:timing>
+    <p:tnLst>
+      <p:par>
+        <p:cTn xmlns:p14="http://schemas.microsoft.com/office/powerpoint/2010/main" id="1" dur="indefinite" restart="never" nodeType="tmRoot"/>
+      </p:par>
+    </p:tnLst>
+  </p:timing>
+</p:sld>
+</file>
+
+<file path=ppt/slides/slide11.xml><?xml version="1.0" encoding="utf-8"?>
+<p:sld xmlns:a="http://schemas.openxmlformats.org/drawingml/2006/main" xmlns:r="http://schemas.openxmlformats.org/officeDocument/2006/relationships" xmlns:p="http://schemas.openxmlformats.org/presentationml/2006/main">
+  <p:cSld>
+    <p:spTree>
+      <p:nvGrpSpPr>
+        <p:cNvPr id="1" name=""/>
+        <p:cNvGrpSpPr/>
+        <p:nvPr/>
+      </p:nvGrpSpPr>
+      <p:grpSpPr>
+        <a:xfrm>
+          <a:off x="0" y="0"/>
+          <a:ext cx="0" cy="0"/>
+          <a:chOff x="0" y="0"/>
+          <a:chExt cx="0" cy="0"/>
+        </a:xfrm>
+      </p:grpSpPr>
+      <p:pic>
+        <p:nvPicPr>
+          <p:cNvPr id="10" name="Picture 9" descr="Screen Shot 2013-05-23 at 4.57.44 PM.png"/>
+          <p:cNvPicPr>
+            <a:picLocks noChangeAspect="1"/>
+          </p:cNvPicPr>
+          <p:nvPr/>
+        </p:nvPicPr>
+        <p:blipFill>
+          <a:blip r:embed="rId2">
+            <a:extLst>
+              <a:ext uri="{28A0092B-C50C-407E-A947-70E740481C1C}">
+                <a14:useLocalDpi xmlns:a14="http://schemas.microsoft.com/office/drawing/2010/main" val="0"/>
+              </a:ext>
+            </a:extLst>
+          </a:blip>
+          <a:stretch>
+            <a:fillRect/>
+          </a:stretch>
+        </p:blipFill>
+        <p:spPr>
+          <a:xfrm>
+            <a:off x="0" y="162120"/>
+            <a:ext cx="9144000" cy="5998428"/>
+          </a:xfrm>
+          <a:prstGeom prst="rect">
+            <a:avLst/>
+          </a:prstGeom>
+        </p:spPr>
+      </p:pic>
+      <p:sp>
+        <p:nvSpPr>
+          <p:cNvPr id="6" name="TextBox 5"/>
+          <p:cNvSpPr txBox="1"/>
+          <p:nvPr/>
+        </p:nvSpPr>
+        <p:spPr>
+          <a:xfrm>
+            <a:off x="973475" y="1013248"/>
+            <a:ext cx="7052437" cy="646331"/>
+          </a:xfrm>
+          <a:prstGeom prst="rect">
+            <a:avLst/>
+          </a:prstGeom>
+          <a:noFill/>
+        </p:spPr>
+        <p:txBody>
+          <a:bodyPr wrap="square" rtlCol="0">
+            <a:spAutoFit/>
+          </a:bodyPr>
+          <a:lstStyle/>
+          <a:p>
+            <a:r>
+              <a:rPr lang="en-US" dirty="0" smtClean="0"/>
+              <a:t>You have indicated that you would like to meet Ron. Guess what? He wants to meet you too! Here are his contact details:</a:t>
+            </a:r>
+          </a:p>
+        </p:txBody>
+      </p:sp>
+      <p:sp>
+        <p:nvSpPr>
+          <p:cNvPr id="2" name="TextBox 1"/>
+          <p:cNvSpPr txBox="1"/>
+          <p:nvPr/>
+        </p:nvSpPr>
+        <p:spPr>
+          <a:xfrm>
+            <a:off x="3729212" y="2958684"/>
+            <a:ext cx="2982269" cy="923330"/>
+          </a:xfrm>
+          <a:prstGeom prst="rect">
+            <a:avLst/>
+          </a:prstGeom>
+          <a:noFill/>
+        </p:spPr>
+        <p:txBody>
+          <a:bodyPr wrap="none" rtlCol="0">
+            <a:spAutoFit/>
+          </a:bodyPr>
+          <a:lstStyle/>
+          <a:p>
+            <a:r>
+              <a:rPr lang="en-US" dirty="0" smtClean="0"/>
+              <a:t>HP: 92225544</a:t>
+            </a:r>
+          </a:p>
+          <a:p>
+            <a:r>
+              <a:rPr lang="en-US" dirty="0" smtClean="0"/>
+              <a:t>Email: </a:t>
+            </a:r>
+            <a:r>
+              <a:rPr lang="en-US" dirty="0" err="1" smtClean="0"/>
+              <a:t>ron_carlos@gmail.com</a:t>
+            </a:r>
+            <a:endParaRPr lang="en-US" dirty="0" smtClean="0"/>
+          </a:p>
+          <a:p>
+            <a:endParaRPr lang="en-US" dirty="0"/>
+          </a:p>
+        </p:txBody>
+      </p:sp>
+      <p:pic>
+        <p:nvPicPr>
+          <p:cNvPr id="7" name="Picture 6" descr="ron carlos.jpg"/>
+          <p:cNvPicPr>
+            <a:picLocks noChangeAspect="1"/>
+          </p:cNvPicPr>
+          <p:nvPr/>
+        </p:nvPicPr>
+        <p:blipFill>
+          <a:blip r:embed="rId3">
+            <a:extLst>
+              <a:ext uri="{28A0092B-C50C-407E-A947-70E740481C1C}">
+                <a14:useLocalDpi xmlns:a14="http://schemas.microsoft.com/office/drawing/2010/main" val="0"/>
+              </a:ext>
+            </a:extLst>
+          </a:blip>
+          <a:stretch>
+            <a:fillRect/>
+          </a:stretch>
+        </p:blipFill>
+        <p:spPr>
+          <a:xfrm>
+            <a:off x="973475" y="2437807"/>
+            <a:ext cx="2193844" cy="2150911"/>
+          </a:xfrm>
+          <a:prstGeom prst="rect">
+            <a:avLst/>
+          </a:prstGeom>
+        </p:spPr>
+      </p:pic>
+      <p:sp>
+        <p:nvSpPr>
+          <p:cNvPr id="8" name="Rectangle 7"/>
+          <p:cNvSpPr/>
+          <p:nvPr/>
+        </p:nvSpPr>
+        <p:spPr>
+          <a:xfrm>
+            <a:off x="1540345" y="243179"/>
+            <a:ext cx="567472" cy="283710"/>
+          </a:xfrm>
+          <a:prstGeom prst="rect">
+            <a:avLst/>
+          </a:prstGeom>
+          <a:noFill/>
+          <a:ln w="28575" cmpd="sng">
+            <a:solidFill>
+              <a:schemeClr val="accent5">
+                <a:lumMod val="50000"/>
+              </a:schemeClr>
+            </a:solidFill>
+          </a:ln>
+        </p:spPr>
+        <p:style>
+          <a:lnRef idx="1">
+            <a:schemeClr val="accent1"/>
+          </a:lnRef>
+          <a:fillRef idx="3">
+            <a:schemeClr val="accent1"/>
+          </a:fillRef>
+          <a:effectRef idx="2">
+            <a:schemeClr val="accent1"/>
+          </a:effectRef>
+          <a:fontRef idx="minor">
+            <a:schemeClr val="lt1"/>
+          </a:fontRef>
+        </p:style>
+        <p:txBody>
+          <a:bodyPr rtlCol="0" anchor="ctr"/>
+          <a:lstStyle/>
+          <a:p>
+            <a:pPr algn="ctr"/>
+            <a:endParaRPr lang="en-US"/>
+          </a:p>
+        </p:txBody>
+      </p:sp>
+    </p:spTree>
+    <p:extLst>
+      <p:ext uri="{BB962C8B-B14F-4D97-AF65-F5344CB8AC3E}">
+        <p14:creationId xmlns:p14="http://schemas.microsoft.com/office/powerpoint/2010/main" val="1908564628"/>
+      </p:ext>
+    </p:extLst>
+  </p:cSld>
+  <p:clrMapOvr>
+    <a:masterClrMapping/>
+  </p:clrMapOvr>
+  <p:timing>
+    <p:tnLst>
+      <p:par>
+        <p:cTn xmlns:p14="http://schemas.microsoft.com/office/powerpoint/2010/main" id="1" dur="indefinite" restart="never" nodeType="tmRoot"/>
+      </p:par>
+    </p:tnLst>
+  </p:timing>
 </p:sld>
 </file>
 
@@ -3196,14 +3655,16 @@
         </p:nvSpPr>
         <p:spPr/>
         <p:txBody>
-          <a:bodyPr>
-            <a:normAutofit fontScale="90000"/>
-          </a:bodyPr>
+          <a:bodyPr/>
           <a:lstStyle/>
           <a:p>
             <a:r>
               <a:rPr lang="en-US" dirty="0" smtClean="0"/>
-              <a:t>Problem with current dating websites</a:t>
+              <a:t>Major </a:t>
+            </a:r>
+            <a:r>
+              <a:rPr lang="en-US" dirty="0" err="1" smtClean="0"/>
+              <a:t>Oobage</a:t>
             </a:r>
             <a:endParaRPr lang="en-US" dirty="0"/>
           </a:p>
@@ -3226,20 +3687,14 @@
           <a:p>
             <a:r>
               <a:rPr lang="en-US" dirty="0" smtClean="0"/>
-              <a:t>You do not trust the people out there.</a:t>
-            </a:r>
-          </a:p>
-          <a:p>
+              <a:t>Dating website</a:t>
+            </a:r>
+          </a:p>
+          <a:p>
+            <a:pPr lvl="1"/>
             <a:r>
               <a:rPr lang="en-US" dirty="0" smtClean="0"/>
-              <a:t>Solution:</a:t>
-            </a:r>
-          </a:p>
-          <a:p>
-            <a:pPr lvl="1"/>
-            <a:r>
-              <a:rPr lang="en-US" dirty="0" smtClean="0"/>
-              <a:t>Restrict the site according to schools. Only people from the same school can see each other.</a:t>
+              <a:t>allows people to meet other singles online.</a:t>
             </a:r>
             <a:endParaRPr lang="en-US" dirty="0"/>
           </a:p>
@@ -3248,13 +3703,20 @@
     </p:spTree>
     <p:extLst>
       <p:ext uri="{BB962C8B-B14F-4D97-AF65-F5344CB8AC3E}">
-        <p14:creationId xmlns:p14="http://schemas.microsoft.com/office/powerpoint/2010/main" val="2203910243"/>
+        <p14:creationId xmlns:p14="http://schemas.microsoft.com/office/powerpoint/2010/main" val="133750671"/>
       </p:ext>
     </p:extLst>
   </p:cSld>
   <p:clrMapOvr>
     <a:masterClrMapping/>
   </p:clrMapOvr>
+  <p:timing>
+    <p:tnLst>
+      <p:par>
+        <p:cTn xmlns:p14="http://schemas.microsoft.com/office/powerpoint/2010/main" id="1" dur="indefinite" restart="never" nodeType="tmRoot"/>
+      </p:par>
+    </p:tnLst>
+  </p:timing>
 </p:sld>
 </file>
 
@@ -3282,7 +3744,7 @@
             <a:spLocks noGrp="1"/>
           </p:cNvSpPr>
           <p:nvPr>
-            <p:ph type="ctrTitle"/>
+            <p:ph type="title"/>
           </p:nvPr>
         </p:nvSpPr>
         <p:spPr/>
@@ -3290,18 +3752,22 @@
           <a:bodyPr/>
           <a:lstStyle/>
           <a:p>
-            <a:endParaRPr lang="en-US"/>
-          </a:p>
-        </p:txBody>
-      </p:sp>
-      <p:sp>
-        <p:nvSpPr>
-          <p:cNvPr id="3" name="Subtitle 2"/>
-          <p:cNvSpPr>
-            <a:spLocks noGrp="1"/>
-          </p:cNvSpPr>
-          <p:nvPr>
-            <p:ph type="subTitle" idx="1"/>
+            <a:r>
+              <a:rPr lang="en-US" dirty="0" smtClean="0"/>
+              <a:t>Target audience</a:t>
+            </a:r>
+            <a:endParaRPr lang="en-US" dirty="0"/>
+          </a:p>
+        </p:txBody>
+      </p:sp>
+      <p:sp>
+        <p:nvSpPr>
+          <p:cNvPr id="3" name="Content Placeholder 2"/>
+          <p:cNvSpPr>
+            <a:spLocks noGrp="1"/>
+          </p:cNvSpPr>
+          <p:nvPr>
+            <p:ph idx="1"/>
           </p:nvPr>
         </p:nvSpPr>
         <p:spPr/>
@@ -3309,13 +3775,152 @@
           <a:bodyPr/>
           <a:lstStyle/>
           <a:p>
-            <a:endParaRPr lang="en-US"/>
-          </a:p>
-        </p:txBody>
-      </p:sp>
+            <a:r>
+              <a:rPr lang="en-US" dirty="0" smtClean="0"/>
+              <a:t>Students from the 4 local universities: NUS, NTU, SMU and SUTD</a:t>
+            </a:r>
+            <a:endParaRPr lang="en-US" dirty="0"/>
+          </a:p>
+        </p:txBody>
+      </p:sp>
+    </p:spTree>
+    <p:extLst>
+      <p:ext uri="{BB962C8B-B14F-4D97-AF65-F5344CB8AC3E}">
+        <p14:creationId xmlns:p14="http://schemas.microsoft.com/office/powerpoint/2010/main" val="2795972600"/>
+      </p:ext>
+    </p:extLst>
+  </p:cSld>
+  <p:clrMapOvr>
+    <a:masterClrMapping/>
+  </p:clrMapOvr>
+</p:sld>
+</file>
+
+<file path=ppt/slides/slide4.xml><?xml version="1.0" encoding="utf-8"?>
+<p:sld xmlns:a="http://schemas.openxmlformats.org/drawingml/2006/main" xmlns:r="http://schemas.openxmlformats.org/officeDocument/2006/relationships" xmlns:p="http://schemas.openxmlformats.org/presentationml/2006/main">
+  <p:cSld>
+    <p:spTree>
+      <p:nvGrpSpPr>
+        <p:cNvPr id="1" name=""/>
+        <p:cNvGrpSpPr/>
+        <p:nvPr/>
+      </p:nvGrpSpPr>
+      <p:grpSpPr>
+        <a:xfrm>
+          <a:off x="0" y="0"/>
+          <a:ext cx="0" cy="0"/>
+          <a:chOff x="0" y="0"/>
+          <a:chExt cx="0" cy="0"/>
+        </a:xfrm>
+      </p:grpSpPr>
+      <p:sp>
+        <p:nvSpPr>
+          <p:cNvPr id="2" name="Title 1"/>
+          <p:cNvSpPr>
+            <a:spLocks noGrp="1"/>
+          </p:cNvSpPr>
+          <p:nvPr>
+            <p:ph type="title"/>
+          </p:nvPr>
+        </p:nvSpPr>
+        <p:spPr/>
+        <p:txBody>
+          <a:bodyPr>
+            <a:normAutofit fontScale="90000"/>
+          </a:bodyPr>
+          <a:lstStyle/>
+          <a:p>
+            <a:r>
+              <a:rPr lang="en-US" dirty="0" smtClean="0"/>
+              <a:t>Problem with current dating websites</a:t>
+            </a:r>
+            <a:endParaRPr lang="en-US" dirty="0"/>
+          </a:p>
+        </p:txBody>
+      </p:sp>
+      <p:sp>
+        <p:nvSpPr>
+          <p:cNvPr id="3" name="Content Placeholder 2"/>
+          <p:cNvSpPr>
+            <a:spLocks noGrp="1"/>
+          </p:cNvSpPr>
+          <p:nvPr>
+            <p:ph idx="1"/>
+          </p:nvPr>
+        </p:nvSpPr>
+        <p:spPr/>
+        <p:txBody>
+          <a:bodyPr/>
+          <a:lstStyle/>
+          <a:p>
+            <a:r>
+              <a:rPr lang="en-US" dirty="0" smtClean="0"/>
+              <a:t>You do not trust the people out there and are therefore hesitant to meet up with those that you find online.</a:t>
+            </a:r>
+          </a:p>
+          <a:p>
+            <a:r>
+              <a:rPr lang="en-US" dirty="0" smtClean="0"/>
+              <a:t>Solution:</a:t>
+            </a:r>
+          </a:p>
+          <a:p>
+            <a:pPr lvl="1"/>
+            <a:r>
+              <a:rPr lang="en-US" dirty="0" smtClean="0"/>
+              <a:t>Only people from the 4 local universities can see each other.</a:t>
+            </a:r>
+          </a:p>
+          <a:p>
+            <a:pPr lvl="1"/>
+            <a:r>
+              <a:rPr lang="en-US" dirty="0" smtClean="0"/>
+              <a:t>Users log in with their school emails.</a:t>
+            </a:r>
+            <a:endParaRPr lang="en-US" dirty="0"/>
+          </a:p>
+        </p:txBody>
+      </p:sp>
+    </p:spTree>
+    <p:extLst>
+      <p:ext uri="{BB962C8B-B14F-4D97-AF65-F5344CB8AC3E}">
+        <p14:creationId xmlns:p14="http://schemas.microsoft.com/office/powerpoint/2010/main" val="2203910243"/>
+      </p:ext>
+    </p:extLst>
+  </p:cSld>
+  <p:clrMapOvr>
+    <a:masterClrMapping/>
+  </p:clrMapOvr>
+  <p:timing>
+    <p:tnLst>
+      <p:par>
+        <p:cTn xmlns:p14="http://schemas.microsoft.com/office/powerpoint/2010/main" id="1" dur="indefinite" restart="never" nodeType="tmRoot"/>
+      </p:par>
+    </p:tnLst>
+  </p:timing>
+</p:sld>
+</file>
+
+<file path=ppt/slides/slide5.xml><?xml version="1.0" encoding="utf-8"?>
+<p:sld xmlns:a="http://schemas.openxmlformats.org/drawingml/2006/main" xmlns:r="http://schemas.openxmlformats.org/officeDocument/2006/relationships" xmlns:p="http://schemas.openxmlformats.org/presentationml/2006/main">
+  <p:cSld>
+    <p:spTree>
+      <p:nvGrpSpPr>
+        <p:cNvPr id="1" name=""/>
+        <p:cNvGrpSpPr/>
+        <p:nvPr/>
+      </p:nvGrpSpPr>
+      <p:grpSpPr>
+        <a:xfrm>
+          <a:off x="0" y="0"/>
+          <a:ext cx="0" cy="0"/>
+          <a:chOff x="0" y="0"/>
+          <a:chExt cx="0" cy="0"/>
+        </a:xfrm>
+      </p:grpSpPr>
       <p:pic>
         <p:nvPicPr>
-          <p:cNvPr id="4" name="Picture 3" descr="Screen Shot 2013-05-23 at 4.22.41 PM.png"/>
+          <p:cNvPr id="4" name="Picture 3" descr="Screen Shot 2013-05-23 at 4.57.44 PM.png"/>
           <p:cNvPicPr>
             <a:picLocks noChangeAspect="1"/>
           </p:cNvPicPr>
@@ -3335,14 +3940,381 @@
         </p:blipFill>
         <p:spPr>
           <a:xfrm>
-            <a:off x="0" y="162119"/>
-            <a:ext cx="9144000" cy="6255117"/>
+            <a:off x="0" y="162120"/>
+            <a:ext cx="9144000" cy="5998428"/>
           </a:xfrm>
           <a:prstGeom prst="rect">
             <a:avLst/>
           </a:prstGeom>
         </p:spPr>
       </p:pic>
+    </p:spTree>
+    <p:extLst>
+      <p:ext uri="{BB962C8B-B14F-4D97-AF65-F5344CB8AC3E}">
+        <p14:creationId xmlns:p14="http://schemas.microsoft.com/office/powerpoint/2010/main" val="1114216578"/>
+      </p:ext>
+    </p:extLst>
+  </p:cSld>
+  <p:clrMapOvr>
+    <a:masterClrMapping/>
+  </p:clrMapOvr>
+  <p:timing>
+    <p:tnLst>
+      <p:par>
+        <p:cTn xmlns:p14="http://schemas.microsoft.com/office/powerpoint/2010/main" id="1" dur="indefinite" restart="never" nodeType="tmRoot"/>
+      </p:par>
+    </p:tnLst>
+  </p:timing>
+</p:sld>
+</file>
+
+<file path=ppt/slides/slide6.xml><?xml version="1.0" encoding="utf-8"?>
+<p:sld xmlns:a="http://schemas.openxmlformats.org/drawingml/2006/main" xmlns:r="http://schemas.openxmlformats.org/officeDocument/2006/relationships" xmlns:p="http://schemas.openxmlformats.org/presentationml/2006/main">
+  <p:cSld>
+    <p:spTree>
+      <p:nvGrpSpPr>
+        <p:cNvPr id="1" name=""/>
+        <p:cNvGrpSpPr/>
+        <p:nvPr/>
+      </p:nvGrpSpPr>
+      <p:grpSpPr>
+        <a:xfrm>
+          <a:off x="0" y="0"/>
+          <a:ext cx="0" cy="0"/>
+          <a:chOff x="0" y="0"/>
+          <a:chExt cx="0" cy="0"/>
+        </a:xfrm>
+      </p:grpSpPr>
+      <p:pic>
+        <p:nvPicPr>
+          <p:cNvPr id="4" name="Picture 3" descr="Screen Shot 2013-05-23 at 4.57.44 PM.png"/>
+          <p:cNvPicPr>
+            <a:picLocks noChangeAspect="1"/>
+          </p:cNvPicPr>
+          <p:nvPr/>
+        </p:nvPicPr>
+        <p:blipFill>
+          <a:blip r:embed="rId2">
+            <a:extLst>
+              <a:ext uri="{28A0092B-C50C-407E-A947-70E740481C1C}">
+                <a14:useLocalDpi xmlns:a14="http://schemas.microsoft.com/office/drawing/2010/main" val="0"/>
+              </a:ext>
+            </a:extLst>
+          </a:blip>
+          <a:stretch>
+            <a:fillRect/>
+          </a:stretch>
+        </p:blipFill>
+        <p:spPr>
+          <a:xfrm>
+            <a:off x="0" y="162120"/>
+            <a:ext cx="9144000" cy="5998428"/>
+          </a:xfrm>
+          <a:prstGeom prst="rect">
+            <a:avLst/>
+          </a:prstGeom>
+        </p:spPr>
+      </p:pic>
+      <p:sp>
+        <p:nvSpPr>
+          <p:cNvPr id="6" name="Rectangle 5"/>
+          <p:cNvSpPr/>
+          <p:nvPr/>
+        </p:nvSpPr>
+        <p:spPr>
+          <a:xfrm>
+            <a:off x="878256" y="229669"/>
+            <a:ext cx="702605" cy="283710"/>
+          </a:xfrm>
+          <a:prstGeom prst="rect">
+            <a:avLst/>
+          </a:prstGeom>
+          <a:noFill/>
+          <a:ln w="28575" cmpd="sng">
+            <a:solidFill>
+              <a:schemeClr val="accent5">
+                <a:lumMod val="50000"/>
+              </a:schemeClr>
+            </a:solidFill>
+          </a:ln>
+        </p:spPr>
+        <p:style>
+          <a:lnRef idx="1">
+            <a:schemeClr val="accent1"/>
+          </a:lnRef>
+          <a:fillRef idx="3">
+            <a:schemeClr val="accent1"/>
+          </a:fillRef>
+          <a:effectRef idx="2">
+            <a:schemeClr val="accent1"/>
+          </a:effectRef>
+          <a:fontRef idx="minor">
+            <a:schemeClr val="lt1"/>
+          </a:fontRef>
+        </p:style>
+        <p:txBody>
+          <a:bodyPr rtlCol="0" anchor="ctr"/>
+          <a:lstStyle/>
+          <a:p>
+            <a:pPr algn="ctr"/>
+            <a:endParaRPr lang="en-US"/>
+          </a:p>
+        </p:txBody>
+      </p:sp>
+    </p:spTree>
+    <p:extLst>
+      <p:ext uri="{BB962C8B-B14F-4D97-AF65-F5344CB8AC3E}">
+        <p14:creationId xmlns:p14="http://schemas.microsoft.com/office/powerpoint/2010/main" val="3570811043"/>
+      </p:ext>
+    </p:extLst>
+  </p:cSld>
+  <p:clrMapOvr>
+    <a:masterClrMapping/>
+  </p:clrMapOvr>
+  <p:timing>
+    <p:tnLst>
+      <p:par>
+        <p:cTn xmlns:p14="http://schemas.microsoft.com/office/powerpoint/2010/main" id="1" dur="indefinite" restart="never" nodeType="tmRoot"/>
+      </p:par>
+    </p:tnLst>
+  </p:timing>
+</p:sld>
+</file>
+
+<file path=ppt/slides/slide7.xml><?xml version="1.0" encoding="utf-8"?>
+<p:sld xmlns:a="http://schemas.openxmlformats.org/drawingml/2006/main" xmlns:r="http://schemas.openxmlformats.org/officeDocument/2006/relationships" xmlns:p="http://schemas.openxmlformats.org/presentationml/2006/main">
+  <p:cSld>
+    <p:spTree>
+      <p:nvGrpSpPr>
+        <p:cNvPr id="1" name=""/>
+        <p:cNvGrpSpPr/>
+        <p:nvPr/>
+      </p:nvGrpSpPr>
+      <p:grpSpPr>
+        <a:xfrm>
+          <a:off x="0" y="0"/>
+          <a:ext cx="0" cy="0"/>
+          <a:chOff x="0" y="0"/>
+          <a:chExt cx="0" cy="0"/>
+        </a:xfrm>
+      </p:grpSpPr>
+      <p:pic>
+        <p:nvPicPr>
+          <p:cNvPr id="9" name="Picture 8" descr="Screen Shot 2013-05-23 at 4.57.44 PM.png"/>
+          <p:cNvPicPr>
+            <a:picLocks noChangeAspect="1"/>
+          </p:cNvPicPr>
+          <p:nvPr/>
+        </p:nvPicPr>
+        <p:blipFill>
+          <a:blip r:embed="rId2">
+            <a:extLst>
+              <a:ext uri="{28A0092B-C50C-407E-A947-70E740481C1C}">
+                <a14:useLocalDpi xmlns:a14="http://schemas.microsoft.com/office/drawing/2010/main" val="0"/>
+              </a:ext>
+            </a:extLst>
+          </a:blip>
+          <a:stretch>
+            <a:fillRect/>
+          </a:stretch>
+        </p:blipFill>
+        <p:spPr>
+          <a:xfrm>
+            <a:off x="0" y="162120"/>
+            <a:ext cx="9144000" cy="5998428"/>
+          </a:xfrm>
+          <a:prstGeom prst="rect">
+            <a:avLst/>
+          </a:prstGeom>
+        </p:spPr>
+      </p:pic>
+      <p:pic>
+        <p:nvPicPr>
+          <p:cNvPr id="5" name="Picture 4" descr="serina-wee-01.jpg"/>
+          <p:cNvPicPr>
+            <a:picLocks noChangeAspect="1"/>
+          </p:cNvPicPr>
+          <p:nvPr/>
+        </p:nvPicPr>
+        <p:blipFill>
+          <a:blip r:embed="rId3">
+            <a:extLst>
+              <a:ext uri="{28A0092B-C50C-407E-A947-70E740481C1C}">
+                <a14:useLocalDpi xmlns:a14="http://schemas.microsoft.com/office/drawing/2010/main" val="0"/>
+              </a:ext>
+            </a:extLst>
+          </a:blip>
+          <a:stretch>
+            <a:fillRect/>
+          </a:stretch>
+        </p:blipFill>
+        <p:spPr>
+          <a:xfrm>
+            <a:off x="1643099" y="1546934"/>
+            <a:ext cx="1914599" cy="2985704"/>
+          </a:xfrm>
+          <a:prstGeom prst="rect">
+            <a:avLst/>
+          </a:prstGeom>
+        </p:spPr>
+      </p:pic>
+      <p:sp>
+        <p:nvSpPr>
+          <p:cNvPr id="6" name="TextBox 5"/>
+          <p:cNvSpPr txBox="1"/>
+          <p:nvPr/>
+        </p:nvSpPr>
+        <p:spPr>
+          <a:xfrm>
+            <a:off x="4094026" y="1999476"/>
+            <a:ext cx="3618975" cy="923330"/>
+          </a:xfrm>
+          <a:prstGeom prst="rect">
+            <a:avLst/>
+          </a:prstGeom>
+          <a:noFill/>
+        </p:spPr>
+        <p:txBody>
+          <a:bodyPr wrap="none" rtlCol="0">
+            <a:spAutoFit/>
+          </a:bodyPr>
+          <a:lstStyle/>
+          <a:p>
+            <a:r>
+              <a:rPr lang="en-US" dirty="0" smtClean="0"/>
+              <a:t>Would you like to meet up with her?</a:t>
+            </a:r>
+          </a:p>
+          <a:p>
+            <a:endParaRPr lang="en-US" dirty="0"/>
+          </a:p>
+          <a:p>
+            <a:r>
+              <a:rPr lang="en-US" u="sng" dirty="0" smtClean="0"/>
+              <a:t>YES</a:t>
+            </a:r>
+            <a:r>
+              <a:rPr lang="en-US" dirty="0" smtClean="0"/>
+              <a:t>      </a:t>
+            </a:r>
+            <a:r>
+              <a:rPr lang="en-US" u="sng" dirty="0" smtClean="0"/>
+              <a:t>NO</a:t>
+            </a:r>
+            <a:endParaRPr lang="en-US" u="sng" dirty="0"/>
+          </a:p>
+        </p:txBody>
+      </p:sp>
+      <p:sp>
+        <p:nvSpPr>
+          <p:cNvPr id="7" name="TextBox 6"/>
+          <p:cNvSpPr txBox="1"/>
+          <p:nvPr/>
+        </p:nvSpPr>
+        <p:spPr>
+          <a:xfrm>
+            <a:off x="1886315" y="4917630"/>
+            <a:ext cx="1258127" cy="369332"/>
+          </a:xfrm>
+          <a:prstGeom prst="rect">
+            <a:avLst/>
+          </a:prstGeom>
+          <a:noFill/>
+        </p:spPr>
+        <p:txBody>
+          <a:bodyPr wrap="none" rtlCol="0">
+            <a:spAutoFit/>
+          </a:bodyPr>
+          <a:lstStyle/>
+          <a:p>
+            <a:r>
+              <a:rPr lang="en-US" dirty="0" err="1" smtClean="0"/>
+              <a:t>Serina</a:t>
+            </a:r>
+            <a:r>
+              <a:rPr lang="en-US" dirty="0" smtClean="0"/>
+              <a:t> Wee</a:t>
+            </a:r>
+            <a:endParaRPr lang="en-US" dirty="0"/>
+          </a:p>
+        </p:txBody>
+      </p:sp>
+      <p:sp>
+        <p:nvSpPr>
+          <p:cNvPr id="8" name="TextBox 7"/>
+          <p:cNvSpPr txBox="1"/>
+          <p:nvPr/>
+        </p:nvSpPr>
+        <p:spPr>
+          <a:xfrm>
+            <a:off x="1643099" y="945698"/>
+            <a:ext cx="1110701" cy="369332"/>
+          </a:xfrm>
+          <a:prstGeom prst="rect">
+            <a:avLst/>
+          </a:prstGeom>
+          <a:noFill/>
+        </p:spPr>
+        <p:txBody>
+          <a:bodyPr wrap="none" rtlCol="0">
+            <a:spAutoFit/>
+          </a:bodyPr>
+          <a:lstStyle/>
+          <a:p>
+            <a:r>
+              <a:rPr lang="en-US" dirty="0" smtClean="0"/>
+              <a:t>Dear Ron, </a:t>
+            </a:r>
+            <a:endParaRPr lang="en-US" dirty="0"/>
+          </a:p>
+        </p:txBody>
+      </p:sp>
+      <p:sp>
+        <p:nvSpPr>
+          <p:cNvPr id="11" name="Rectangle 10"/>
+          <p:cNvSpPr/>
+          <p:nvPr/>
+        </p:nvSpPr>
+        <p:spPr>
+          <a:xfrm>
+            <a:off x="878256" y="229669"/>
+            <a:ext cx="702605" cy="283710"/>
+          </a:xfrm>
+          <a:prstGeom prst="rect">
+            <a:avLst/>
+          </a:prstGeom>
+          <a:noFill/>
+          <a:ln w="28575" cmpd="sng">
+            <a:solidFill>
+              <a:schemeClr val="accent5">
+                <a:lumMod val="50000"/>
+              </a:schemeClr>
+            </a:solidFill>
+          </a:ln>
+        </p:spPr>
+        <p:style>
+          <a:lnRef idx="1">
+            <a:schemeClr val="accent1"/>
+          </a:lnRef>
+          <a:fillRef idx="3">
+            <a:schemeClr val="accent1"/>
+          </a:fillRef>
+          <a:effectRef idx="2">
+            <a:schemeClr val="accent1"/>
+          </a:effectRef>
+          <a:fontRef idx="minor">
+            <a:schemeClr val="lt1"/>
+          </a:fontRef>
+        </p:style>
+        <p:txBody>
+          <a:bodyPr rtlCol="0" anchor="ctr"/>
+          <a:lstStyle/>
+          <a:p>
+            <a:pPr algn="ctr"/>
+            <a:endParaRPr lang="en-US"/>
+          </a:p>
+        </p:txBody>
+      </p:sp>
     </p:spTree>
     <p:extLst>
       <p:ext uri="{BB962C8B-B14F-4D97-AF65-F5344CB8AC3E}">
@@ -3353,6 +4325,384 @@
   <p:clrMapOvr>
     <a:masterClrMapping/>
   </p:clrMapOvr>
+  <p:timing>
+    <p:tnLst>
+      <p:par>
+        <p:cTn xmlns:p14="http://schemas.microsoft.com/office/powerpoint/2010/main" id="1" dur="indefinite" restart="never" nodeType="tmRoot"/>
+      </p:par>
+    </p:tnLst>
+  </p:timing>
+</p:sld>
+</file>
+
+<file path=ppt/slides/slide8.xml><?xml version="1.0" encoding="utf-8"?>
+<p:sld xmlns:a="http://schemas.openxmlformats.org/drawingml/2006/main" xmlns:r="http://schemas.openxmlformats.org/officeDocument/2006/relationships" xmlns:p="http://schemas.openxmlformats.org/presentationml/2006/main">
+  <p:cSld>
+    <p:spTree>
+      <p:nvGrpSpPr>
+        <p:cNvPr id="1" name=""/>
+        <p:cNvGrpSpPr/>
+        <p:nvPr/>
+      </p:nvGrpSpPr>
+      <p:grpSpPr>
+        <a:xfrm>
+          <a:off x="0" y="0"/>
+          <a:ext cx="0" cy="0"/>
+          <a:chOff x="0" y="0"/>
+          <a:chExt cx="0" cy="0"/>
+        </a:xfrm>
+      </p:grpSpPr>
+      <p:pic>
+        <p:nvPicPr>
+          <p:cNvPr id="10" name="Picture 9" descr="Screen Shot 2013-05-23 at 4.57.44 PM.png"/>
+          <p:cNvPicPr>
+            <a:picLocks noChangeAspect="1"/>
+          </p:cNvPicPr>
+          <p:nvPr/>
+        </p:nvPicPr>
+        <p:blipFill>
+          <a:blip r:embed="rId2">
+            <a:extLst>
+              <a:ext uri="{28A0092B-C50C-407E-A947-70E740481C1C}">
+                <a14:useLocalDpi xmlns:a14="http://schemas.microsoft.com/office/drawing/2010/main" val="0"/>
+              </a:ext>
+            </a:extLst>
+          </a:blip>
+          <a:stretch>
+            <a:fillRect/>
+          </a:stretch>
+        </p:blipFill>
+        <p:spPr>
+          <a:xfrm>
+            <a:off x="0" y="162120"/>
+            <a:ext cx="9144000" cy="5998428"/>
+          </a:xfrm>
+          <a:prstGeom prst="rect">
+            <a:avLst/>
+          </a:prstGeom>
+        </p:spPr>
+      </p:pic>
+      <p:sp>
+        <p:nvSpPr>
+          <p:cNvPr id="6" name="TextBox 5"/>
+          <p:cNvSpPr txBox="1"/>
+          <p:nvPr/>
+        </p:nvSpPr>
+        <p:spPr>
+          <a:xfrm>
+            <a:off x="4364258" y="1999476"/>
+            <a:ext cx="3390783" cy="1200329"/>
+          </a:xfrm>
+          <a:prstGeom prst="rect">
+            <a:avLst/>
+          </a:prstGeom>
+          <a:noFill/>
+        </p:spPr>
+        <p:txBody>
+          <a:bodyPr wrap="square" rtlCol="0">
+            <a:spAutoFit/>
+          </a:bodyPr>
+          <a:lstStyle/>
+          <a:p>
+            <a:r>
+              <a:rPr lang="en-US" dirty="0" smtClean="0"/>
+              <a:t>Would you like to meet up with him?</a:t>
+            </a:r>
+          </a:p>
+          <a:p>
+            <a:endParaRPr lang="en-US" dirty="0"/>
+          </a:p>
+          <a:p>
+            <a:r>
+              <a:rPr lang="en-US" u="sng" dirty="0" smtClean="0"/>
+              <a:t>YES</a:t>
+            </a:r>
+            <a:r>
+              <a:rPr lang="en-US" dirty="0" smtClean="0"/>
+              <a:t>      </a:t>
+            </a:r>
+            <a:r>
+              <a:rPr lang="en-US" u="sng" dirty="0" smtClean="0"/>
+              <a:t>NO</a:t>
+            </a:r>
+            <a:endParaRPr lang="en-US" u="sng" dirty="0"/>
+          </a:p>
+        </p:txBody>
+      </p:sp>
+      <p:sp>
+        <p:nvSpPr>
+          <p:cNvPr id="7" name="TextBox 6"/>
+          <p:cNvSpPr txBox="1"/>
+          <p:nvPr/>
+        </p:nvSpPr>
+        <p:spPr>
+          <a:xfrm>
+            <a:off x="2650202" y="4043956"/>
+            <a:ext cx="553006" cy="369332"/>
+          </a:xfrm>
+          <a:prstGeom prst="rect">
+            <a:avLst/>
+          </a:prstGeom>
+          <a:noFill/>
+        </p:spPr>
+        <p:txBody>
+          <a:bodyPr wrap="none" rtlCol="0">
+            <a:spAutoFit/>
+          </a:bodyPr>
+          <a:lstStyle/>
+          <a:p>
+            <a:r>
+              <a:rPr lang="en-US" dirty="0" smtClean="0"/>
+              <a:t>Ron</a:t>
+            </a:r>
+            <a:endParaRPr lang="en-US" dirty="0"/>
+          </a:p>
+        </p:txBody>
+      </p:sp>
+      <p:sp>
+        <p:nvSpPr>
+          <p:cNvPr id="8" name="TextBox 7"/>
+          <p:cNvSpPr txBox="1"/>
+          <p:nvPr/>
+        </p:nvSpPr>
+        <p:spPr>
+          <a:xfrm>
+            <a:off x="1643099" y="945698"/>
+            <a:ext cx="1815822" cy="369332"/>
+          </a:xfrm>
+          <a:prstGeom prst="rect">
+            <a:avLst/>
+          </a:prstGeom>
+          <a:noFill/>
+        </p:spPr>
+        <p:txBody>
+          <a:bodyPr wrap="none" rtlCol="0">
+            <a:spAutoFit/>
+          </a:bodyPr>
+          <a:lstStyle/>
+          <a:p>
+            <a:r>
+              <a:rPr lang="en-US" dirty="0" smtClean="0"/>
+              <a:t>Dear </a:t>
+            </a:r>
+            <a:r>
+              <a:rPr lang="en-US" dirty="0" err="1" smtClean="0"/>
+              <a:t>Serina</a:t>
+            </a:r>
+            <a:r>
+              <a:rPr lang="en-US" dirty="0" smtClean="0"/>
+              <a:t> Wee, </a:t>
+            </a:r>
+            <a:endParaRPr lang="en-US" dirty="0"/>
+          </a:p>
+        </p:txBody>
+      </p:sp>
+      <p:pic>
+        <p:nvPicPr>
+          <p:cNvPr id="9" name="Picture 8" descr="ron carlos.jpg"/>
+          <p:cNvPicPr>
+            <a:picLocks noChangeAspect="1"/>
+          </p:cNvPicPr>
+          <p:nvPr/>
+        </p:nvPicPr>
+        <p:blipFill>
+          <a:blip r:embed="rId3">
+            <a:extLst>
+              <a:ext uri="{28A0092B-C50C-407E-A947-70E740481C1C}">
+                <a14:useLocalDpi xmlns:a14="http://schemas.microsoft.com/office/drawing/2010/main" val="0"/>
+              </a:ext>
+            </a:extLst>
+          </a:blip>
+          <a:stretch>
+            <a:fillRect/>
+          </a:stretch>
+        </p:blipFill>
+        <p:spPr>
+          <a:xfrm>
+            <a:off x="1783536" y="1735289"/>
+            <a:ext cx="2193844" cy="2150911"/>
+          </a:xfrm>
+          <a:prstGeom prst="rect">
+            <a:avLst/>
+          </a:prstGeom>
+        </p:spPr>
+      </p:pic>
+      <p:sp>
+        <p:nvSpPr>
+          <p:cNvPr id="11" name="Rectangle 10"/>
+          <p:cNvSpPr/>
+          <p:nvPr/>
+        </p:nvSpPr>
+        <p:spPr>
+          <a:xfrm>
+            <a:off x="878256" y="229669"/>
+            <a:ext cx="702605" cy="283710"/>
+          </a:xfrm>
+          <a:prstGeom prst="rect">
+            <a:avLst/>
+          </a:prstGeom>
+          <a:noFill/>
+          <a:ln w="28575" cmpd="sng">
+            <a:solidFill>
+              <a:schemeClr val="accent5">
+                <a:lumMod val="50000"/>
+              </a:schemeClr>
+            </a:solidFill>
+          </a:ln>
+        </p:spPr>
+        <p:style>
+          <a:lnRef idx="1">
+            <a:schemeClr val="accent1"/>
+          </a:lnRef>
+          <a:fillRef idx="3">
+            <a:schemeClr val="accent1"/>
+          </a:fillRef>
+          <a:effectRef idx="2">
+            <a:schemeClr val="accent1"/>
+          </a:effectRef>
+          <a:fontRef idx="minor">
+            <a:schemeClr val="lt1"/>
+          </a:fontRef>
+        </p:style>
+        <p:txBody>
+          <a:bodyPr rtlCol="0" anchor="ctr"/>
+          <a:lstStyle/>
+          <a:p>
+            <a:pPr algn="ctr"/>
+            <a:endParaRPr lang="en-US"/>
+          </a:p>
+        </p:txBody>
+      </p:sp>
+    </p:spTree>
+    <p:extLst>
+      <p:ext uri="{BB962C8B-B14F-4D97-AF65-F5344CB8AC3E}">
+        <p14:creationId xmlns:p14="http://schemas.microsoft.com/office/powerpoint/2010/main" val="2007668428"/>
+      </p:ext>
+    </p:extLst>
+  </p:cSld>
+  <p:clrMapOvr>
+    <a:masterClrMapping/>
+  </p:clrMapOvr>
+  <p:timing>
+    <p:tnLst>
+      <p:par>
+        <p:cTn xmlns:p14="http://schemas.microsoft.com/office/powerpoint/2010/main" id="1" dur="indefinite" restart="never" nodeType="tmRoot"/>
+      </p:par>
+    </p:tnLst>
+  </p:timing>
+</p:sld>
+</file>
+
+<file path=ppt/slides/slide9.xml><?xml version="1.0" encoding="utf-8"?>
+<p:sld xmlns:a="http://schemas.openxmlformats.org/drawingml/2006/main" xmlns:r="http://schemas.openxmlformats.org/officeDocument/2006/relationships" xmlns:p="http://schemas.openxmlformats.org/presentationml/2006/main">
+  <p:cSld>
+    <p:spTree>
+      <p:nvGrpSpPr>
+        <p:cNvPr id="1" name=""/>
+        <p:cNvGrpSpPr/>
+        <p:nvPr/>
+      </p:nvGrpSpPr>
+      <p:grpSpPr>
+        <a:xfrm>
+          <a:off x="0" y="0"/>
+          <a:ext cx="0" cy="0"/>
+          <a:chOff x="0" y="0"/>
+          <a:chExt cx="0" cy="0"/>
+        </a:xfrm>
+      </p:grpSpPr>
+      <p:pic>
+        <p:nvPicPr>
+          <p:cNvPr id="4" name="Picture 3" descr="Screen Shot 2013-05-23 at 4.57.44 PM.png"/>
+          <p:cNvPicPr>
+            <a:picLocks noChangeAspect="1"/>
+          </p:cNvPicPr>
+          <p:nvPr/>
+        </p:nvPicPr>
+        <p:blipFill>
+          <a:blip r:embed="rId2">
+            <a:extLst>
+              <a:ext uri="{28A0092B-C50C-407E-A947-70E740481C1C}">
+                <a14:useLocalDpi xmlns:a14="http://schemas.microsoft.com/office/drawing/2010/main" val="0"/>
+              </a:ext>
+            </a:extLst>
+          </a:blip>
+          <a:stretch>
+            <a:fillRect/>
+          </a:stretch>
+        </p:blipFill>
+        <p:spPr>
+          <a:xfrm>
+            <a:off x="0" y="162120"/>
+            <a:ext cx="9144000" cy="5998428"/>
+          </a:xfrm>
+          <a:prstGeom prst="rect">
+            <a:avLst/>
+          </a:prstGeom>
+        </p:spPr>
+      </p:pic>
+      <p:sp>
+        <p:nvSpPr>
+          <p:cNvPr id="5" name="Rectangle 4"/>
+          <p:cNvSpPr/>
+          <p:nvPr/>
+        </p:nvSpPr>
+        <p:spPr>
+          <a:xfrm>
+            <a:off x="1540345" y="243179"/>
+            <a:ext cx="567472" cy="283710"/>
+          </a:xfrm>
+          <a:prstGeom prst="rect">
+            <a:avLst/>
+          </a:prstGeom>
+          <a:noFill/>
+          <a:ln w="28575" cmpd="sng">
+            <a:solidFill>
+              <a:schemeClr val="accent5">
+                <a:lumMod val="50000"/>
+              </a:schemeClr>
+            </a:solidFill>
+          </a:ln>
+        </p:spPr>
+        <p:style>
+          <a:lnRef idx="1">
+            <a:schemeClr val="accent1"/>
+          </a:lnRef>
+          <a:fillRef idx="3">
+            <a:schemeClr val="accent1"/>
+          </a:fillRef>
+          <a:effectRef idx="2">
+            <a:schemeClr val="accent1"/>
+          </a:effectRef>
+          <a:fontRef idx="minor">
+            <a:schemeClr val="lt1"/>
+          </a:fontRef>
+        </p:style>
+        <p:txBody>
+          <a:bodyPr rtlCol="0" anchor="ctr"/>
+          <a:lstStyle/>
+          <a:p>
+            <a:pPr algn="ctr"/>
+            <a:endParaRPr lang="en-US"/>
+          </a:p>
+        </p:txBody>
+      </p:sp>
+    </p:spTree>
+    <p:extLst>
+      <p:ext uri="{BB962C8B-B14F-4D97-AF65-F5344CB8AC3E}">
+        <p14:creationId xmlns:p14="http://schemas.microsoft.com/office/powerpoint/2010/main" val="3103505887"/>
+      </p:ext>
+    </p:extLst>
+  </p:cSld>
+  <p:clrMapOvr>
+    <a:masterClrMapping/>
+  </p:clrMapOvr>
+  <p:timing>
+    <p:tnLst>
+      <p:par>
+        <p:cTn xmlns:p14="http://schemas.microsoft.com/office/powerpoint/2010/main" id="1" dur="indefinite" restart="never" nodeType="tmRoot"/>
+      </p:par>
+    </p:tnLst>
+  </p:timing>
 </p:sld>
 </file>
 

</xml_diff>